<commit_message>
slides4m trivial edit, PS_antichains tweaks
</commit_message>
<xml_diff>
--- a/restricted/slides4m.pptx
+++ b/restricted/slides4m.pptx
@@ -279,7 +279,7 @@
             <a:fld id="{D875CB5D-1501-4E8C-8449-8F562B53033D}" type="datetimeFigureOut">
               <a:rPr lang="en-US" smtClean="0"/>
               <a:pPr/>
-              <a:t>2/21/10</a:t>
+              <a:t>2/22/10</a:t>
             </a:fld>
             <a:endParaRPr lang="en-US"/>
           </a:p>
@@ -441,7 +441,7 @@
             <a:fld id="{2E64E5CB-D4EF-403A-9BB6-139C52688DF7}" type="datetimeFigureOut">
               <a:rPr lang="en-US" smtClean="0"/>
               <a:pPr/>
-              <a:t>2/21/10</a:t>
+              <a:t>2/22/10</a:t>
             </a:fld>
             <a:endParaRPr lang="en-US"/>
           </a:p>
@@ -6366,7 +6366,15 @@
                   <a:srgbClr val="FF33CC"/>
                 </a:solidFill>
               </a:rPr>
-              <a:t>Induction Step: Assume </a:t>
+              <a:t>Inductive </a:t>
+            </a:r>
+            <a:r>
+              <a:rPr lang="en-US" sz="4400" dirty="0" smtClean="0">
+                <a:solidFill>
+                  <a:srgbClr val="FF33CC"/>
+                </a:solidFill>
+              </a:rPr>
+              <a:t>Step: Assume </a:t>
             </a:r>
             <a:r>
               <a:rPr lang="en-US" sz="4400" dirty="0" smtClean="0">

</xml_diff>

<commit_message>
change in slides4m.pptx from office-working copy
</commit_message>
<xml_diff>
--- a/restricted/slides4m.pptx
+++ b/restricted/slides4m.pptx
@@ -2,7 +2,7 @@
 <file path=ppt/presentation.xml><?xml version="1.0" encoding="utf-8"?>
 <p:presentation xmlns:a="http://schemas.openxmlformats.org/drawingml/2006/main" xmlns:r="http://schemas.openxmlformats.org/officeDocument/2006/relationships" xmlns:mc="http://schemas.openxmlformats.org/markup-compatibility/2006" xmlns:mv="urn:schemas-microsoft-com:mac:vml" xmlns:p="http://schemas.openxmlformats.org/presentationml/2006/main" mc:Ignorable="mv" mc:PreserveAttributes="mv:*" embedTrueTypeFonts="1" saveSubsetFonts="1">
   <p:sldMasterIdLst>
-    <p:sldMasterId id="2147483648" r:id="rId1"/>
+    <p:sldMasterId r:id="rId1"/>
   </p:sldMasterIdLst>
   <p:notesMasterIdLst>
     <p:notesMasterId r:id="rId49"/>
@@ -279,7 +279,7 @@
             <a:fld id="{D875CB5D-1501-4E8C-8449-8F562B53033D}" type="datetimeFigureOut">
               <a:rPr lang="en-US" smtClean="0"/>
               <a:pPr/>
-              <a:t>2/22/10</a:t>
+              <a:t>2/24/10</a:t>
             </a:fld>
             <a:endParaRPr lang="en-US"/>
           </a:p>
@@ -441,7 +441,7 @@
             <a:fld id="{2E64E5CB-D4EF-403A-9BB6-139C52688DF7}" type="datetimeFigureOut">
               <a:rPr lang="en-US" smtClean="0"/>
               <a:pPr/>
-              <a:t>2/22/10</a:t>
+              <a:t>2/24/10</a:t>
             </a:fld>
             <a:endParaRPr lang="en-US"/>
           </a:p>
@@ -5994,12 +5994,12 @@
   </p:cSld>
   <p:clrMap bg1="lt1" tx1="dk1" bg2="lt2" tx2="dk2" accent1="accent1" accent2="accent2" accent3="accent3" accent4="accent4" accent5="accent5" accent6="accent6" hlink="hlink" folHlink="folHlink"/>
   <p:sldLayoutIdLst>
-    <p:sldLayoutId id="2147483649" r:id="rId1"/>
-    <p:sldLayoutId id="2147483650" r:id="rId2"/>
-    <p:sldLayoutId id="2147483651" r:id="rId3"/>
-    <p:sldLayoutId id="2147483654" r:id="rId4"/>
-    <p:sldLayoutId id="2147483655" r:id="rId5"/>
-    <p:sldLayoutId id="2147483660" r:id="rId6"/>
+    <p:sldLayoutId r:id="rId1"/>
+    <p:sldLayoutId r:id="rId2"/>
+    <p:sldLayoutId r:id="rId3"/>
+    <p:sldLayoutId r:id="rId4"/>
+    <p:sldLayoutId r:id="rId5"/>
+    <p:sldLayoutId r:id="rId6"/>
   </p:sldLayoutIdLst>
   <p:timing>
     <p:tnLst>
@@ -6524,7 +6524,7 @@
         </p:xfrm>
         <a:graphic>
           <a:graphicData uri="http://schemas.openxmlformats.org/presentationml/2006/ole">
-            <p:oleObj spid="_x0000_s4099" name="Equation" r:id="rId4" imgW="1879560" imgH="431640" progId="Equation.DSMT4">
+            <p:oleObj spid="_x0000_s4099" name="Equation" r:id="rId4" imgW="7315200" imgH="1676400" progId="Equation.DSMT4">
               <p:embed/>
             </p:oleObj>
           </a:graphicData>
@@ -6809,7 +6809,7 @@
         </p:xfrm>
         <a:graphic>
           <a:graphicData uri="http://schemas.openxmlformats.org/presentationml/2006/ole">
-            <p:oleObj spid="_x0000_s5124" name="Equation" r:id="rId4" imgW="1562040" imgH="419040" progId="Equation.DSMT4">
+            <p:oleObj spid="_x0000_s5124" name="Equation" r:id="rId4" imgW="7315200" imgH="1968500" progId="Equation.DSMT4">
               <p:embed/>
             </p:oleObj>
           </a:graphicData>
@@ -7158,7 +7158,7 @@
         </p:xfrm>
         <a:graphic>
           <a:graphicData uri="http://schemas.openxmlformats.org/presentationml/2006/ole">
-            <p:oleObj spid="_x0000_s6147" name="Equation" r:id="rId4" imgW="1218960" imgH="863280" progId="Equation.DSMT4">
+            <p:oleObj spid="_x0000_s6147" name="Equation" r:id="rId4" imgW="7315200" imgH="5181600" progId="Equation.DSMT4">
               <p:embed/>
             </p:oleObj>
           </a:graphicData>
@@ -7178,7 +7178,7 @@
         </p:xfrm>
         <a:graphic>
           <a:graphicData uri="http://schemas.openxmlformats.org/presentationml/2006/ole">
-            <p:oleObj spid="_x0000_s6148" name="Equation" r:id="rId5" imgW="2590560" imgH="482400" progId="Equation.DSMT4">
+            <p:oleObj spid="_x0000_s6148" name="Equation" r:id="rId5" imgW="7315200" imgH="1358900" progId="Equation.DSMT4">
               <p:embed/>
             </p:oleObj>
           </a:graphicData>
@@ -7662,7 +7662,7 @@
         </p:xfrm>
         <a:graphic>
           <a:graphicData uri="http://schemas.openxmlformats.org/presentationml/2006/ole">
-            <p:oleObj spid="_x0000_s7170" name="Equation" r:id="rId4" imgW="114120" imgH="215640" progId="Equation.3">
+            <p:oleObj spid="_x0000_s7170" name="Equation" r:id="rId4" imgW="3657600" imgH="6908800" progId="Equation.3">
               <p:embed/>
             </p:oleObj>
           </a:graphicData>
@@ -7808,7 +7808,7 @@
         </p:xfrm>
         <a:graphic>
           <a:graphicData uri="http://schemas.openxmlformats.org/presentationml/2006/ole">
-            <p:oleObj spid="_x0000_s7173" name="Equation" r:id="rId5" imgW="1841400" imgH="431640" progId="Equation.DSMT4">
+            <p:oleObj spid="_x0000_s7173" name="Equation" r:id="rId5" imgW="7315200" imgH="1714500" progId="Equation.DSMT4">
               <p:embed/>
             </p:oleObj>
           </a:graphicData>
@@ -7828,7 +7828,7 @@
         </p:xfrm>
         <a:graphic>
           <a:graphicData uri="http://schemas.openxmlformats.org/presentationml/2006/ole">
-            <p:oleObj spid="_x0000_s7174" name="Equation" r:id="rId6" imgW="2336760" imgH="431640" progId="Equation.DSMT4">
+            <p:oleObj spid="_x0000_s7174" name="Equation" r:id="rId6" imgW="7315200" imgH="1346200" progId="Equation.DSMT4">
               <p:embed/>
             </p:oleObj>
           </a:graphicData>
@@ -8409,7 +8409,7 @@
         </p:xfrm>
         <a:graphic>
           <a:graphicData uri="http://schemas.openxmlformats.org/presentationml/2006/ole">
-            <p:oleObj spid="_x0000_s8195" name="Equation" r:id="rId4" imgW="431640" imgH="431640" progId="Equation.DSMT4">
+            <p:oleObj spid="_x0000_s8195" name="Equation" r:id="rId4" imgW="7315200" imgH="7315200" progId="Equation.DSMT4">
               <p:embed/>
             </p:oleObj>
           </a:graphicData>
@@ -8429,7 +8429,7 @@
         </p:xfrm>
         <a:graphic>
           <a:graphicData uri="http://schemas.openxmlformats.org/presentationml/2006/ole">
-            <p:oleObj spid="_x0000_s8196" name="Equation" r:id="rId5" imgW="1028520" imgH="203040" progId="Equation.DSMT4">
+            <p:oleObj spid="_x0000_s8196" name="Equation" r:id="rId5" imgW="7315200" imgH="1447800" progId="Equation.DSMT4">
               <p:embed/>
             </p:oleObj>
           </a:graphicData>
@@ -9659,7 +9659,7 @@
                 </p:xfrm>
                 <a:graphic>
                   <a:graphicData uri="http://schemas.openxmlformats.org/presentationml/2006/ole">
-                    <p:oleObj spid="_x0000_s9218" name="Equation" r:id="rId4" imgW="177480" imgH="190440" progId="Equation.3">
+                    <p:oleObj spid="_x0000_s9218" name="Equation" r:id="rId4" imgW="5689600" imgH="6096000" progId="Equation.3">
                       <p:embed/>
                     </p:oleObj>
                   </a:graphicData>
@@ -9679,7 +9679,7 @@
                 </p:xfrm>
                 <a:graphic>
                   <a:graphicData uri="http://schemas.openxmlformats.org/presentationml/2006/ole">
-                    <p:oleObj spid="_x0000_s9219" name="Equation" r:id="rId5" imgW="177480" imgH="190440" progId="Equation.3">
+                    <p:oleObj spid="_x0000_s9219" name="Equation" r:id="rId5" imgW="5689600" imgH="6096000" progId="Equation.3">
                       <p:embed/>
                     </p:oleObj>
                   </a:graphicData>
@@ -14739,7 +14739,7 @@
           </p:xfrm>
           <a:graphic>
             <a:graphicData uri="http://schemas.openxmlformats.org/presentationml/2006/ole">
-              <p:oleObj spid="_x0000_s10242" name="Equation" r:id="rId4" imgW="177480" imgH="190440" progId="Equation.3">
+              <p:oleObj spid="_x0000_s10242" name="Equation" r:id="rId4" imgW="5689600" imgH="6096000" progId="Equation.3">
                 <p:embed/>
               </p:oleObj>
             </a:graphicData>
@@ -16203,7 +16203,7 @@
           </p:xfrm>
           <a:graphic>
             <a:graphicData uri="http://schemas.openxmlformats.org/presentationml/2006/ole">
-              <p:oleObj spid="_x0000_s11268" name="Equation" r:id="rId4" imgW="177480" imgH="190440" progId="Equation.3">
+              <p:oleObj spid="_x0000_s11268" name="Equation" r:id="rId4" imgW="5689600" imgH="6096000" progId="Equation.3">
                 <p:embed/>
               </p:oleObj>
             </a:graphicData>
@@ -18997,7 +18997,7 @@
             </p:xfrm>
             <a:graphic>
               <a:graphicData uri="http://schemas.openxmlformats.org/presentationml/2006/ole">
-                <p:oleObj spid="_x0000_s166914" name="Equation" r:id="rId5" imgW="177480" imgH="190440" progId="Equation.3">
+                <p:oleObj spid="_x0000_s166914" name="Equation" r:id="rId5" imgW="5689600" imgH="6096000" progId="Equation.3">
                   <p:embed/>
                 </p:oleObj>
               </a:graphicData>
@@ -19155,7 +19155,7 @@
         </p:xfrm>
         <a:graphic>
           <a:graphicData uri="http://schemas.openxmlformats.org/presentationml/2006/ole">
-            <p:oleObj spid="_x0000_s166915" name="Equation" r:id="rId6" imgW="177480" imgH="190440" progId="Equation.3">
+            <p:oleObj spid="_x0000_s166915" name="Equation" r:id="rId6" imgW="5689600" imgH="6096000" progId="Equation.3">
               <p:embed/>
             </p:oleObj>
           </a:graphicData>
@@ -28234,7 +28234,7 @@
         </p:xfrm>
         <a:graphic>
           <a:graphicData uri="http://schemas.openxmlformats.org/presentationml/2006/ole">
-            <p:oleObj spid="_x0000_s289794" name="Equation" r:id="rId4" imgW="635000" imgH="469900" progId="Equation.DSMT4">
+            <p:oleObj spid="_x0000_s289794" name="Equation" r:id="rId4" imgW="7315200" imgH="5410200" progId="Equation.DSMT4">
               <p:embed/>
             </p:oleObj>
           </a:graphicData>
@@ -28504,7 +28504,7 @@
         </p:xfrm>
         <a:graphic>
           <a:graphicData uri="http://schemas.openxmlformats.org/presentationml/2006/ole">
-            <p:oleObj spid="_x0000_s291842" name="Equation" r:id="rId4" imgW="520700" imgH="469900" progId="Equation.DSMT4">
+            <p:oleObj spid="_x0000_s291842" name="Equation" r:id="rId4" imgW="7315200" imgH="6604000" progId="Equation.DSMT4">
               <p:embed/>
             </p:oleObj>
           </a:graphicData>
@@ -28803,7 +28803,7 @@
         </p:xfrm>
         <a:graphic>
           <a:graphicData uri="http://schemas.openxmlformats.org/presentationml/2006/ole">
-            <p:oleObj spid="_x0000_s293890" name="Equation" r:id="rId4" imgW="723600" imgH="406080" progId="Equation.DSMT4">
+            <p:oleObj spid="_x0000_s293890" name="Equation" r:id="rId4" imgW="7315200" imgH="4102100" progId="Equation.DSMT4">
               <p:embed/>
             </p:oleObj>
           </a:graphicData>
@@ -29353,7 +29353,7 @@
         </p:xfrm>
         <a:graphic>
           <a:graphicData uri="http://schemas.openxmlformats.org/presentationml/2006/ole">
-            <p:oleObj spid="_x0000_s295938" name="Equation" r:id="rId4" imgW="533400" imgH="469900" progId="Equation.DSMT4">
+            <p:oleObj spid="_x0000_s295938" name="Equation" r:id="rId4" imgW="7315200" imgH="6438900" progId="Equation.DSMT4">
               <p:embed/>
             </p:oleObj>
           </a:graphicData>
@@ -29654,7 +29654,7 @@
         </p:xfrm>
         <a:graphic>
           <a:graphicData uri="http://schemas.openxmlformats.org/presentationml/2006/ole">
-            <p:oleObj spid="_x0000_s297986" name="Equation" r:id="rId4" imgW="1333500" imgH="469900" progId="Equation.DSMT4">
+            <p:oleObj spid="_x0000_s297986" name="Equation" r:id="rId4" imgW="7315200" imgH="2578100" progId="Equation.DSMT4">
               <p:embed/>
             </p:oleObj>
           </a:graphicData>
@@ -31200,7 +31200,7 @@
         </p:xfrm>
         <a:graphic>
           <a:graphicData uri="http://schemas.openxmlformats.org/presentationml/2006/ole">
-            <p:oleObj spid="_x0000_s302082" name="Equation" r:id="rId4" imgW="1600200" imgH="469900" progId="Equation.DSMT4">
+            <p:oleObj spid="_x0000_s302082" name="Equation" r:id="rId4" imgW="7315200" imgH="2146300" progId="Equation.DSMT4">
               <p:embed/>
             </p:oleObj>
           </a:graphicData>
@@ -31220,7 +31220,7 @@
         </p:xfrm>
         <a:graphic>
           <a:graphicData uri="http://schemas.openxmlformats.org/presentationml/2006/ole">
-            <p:oleObj spid="_x0000_s302084" name="Equation" r:id="rId5" imgW="1625600" imgH="469900" progId="Equation.DSMT4">
+            <p:oleObj spid="_x0000_s302084" name="Equation" r:id="rId5" imgW="7315200" imgH="2120900" progId="Equation.DSMT4">
               <p:embed/>
             </p:oleObj>
           </a:graphicData>
@@ -31479,7 +31479,7 @@
         </p:xfrm>
         <a:graphic>
           <a:graphicData uri="http://schemas.openxmlformats.org/presentationml/2006/ole">
-            <p:oleObj spid="_x0000_s304130" name="Equation" r:id="rId4" imgW="1587500" imgH="469900" progId="Equation.DSMT4">
+            <p:oleObj spid="_x0000_s304130" name="Equation" r:id="rId4" imgW="7315200" imgH="2159000" progId="Equation.DSMT4">
               <p:embed/>
             </p:oleObj>
           </a:graphicData>
@@ -31659,7 +31659,7 @@
         </p:xfrm>
         <a:graphic>
           <a:graphicData uri="http://schemas.openxmlformats.org/presentationml/2006/ole">
-            <p:oleObj spid="_x0000_s304131" name="Equation" r:id="rId6" imgW="1841500" imgH="469900" progId="Equation.DSMT4">
+            <p:oleObj spid="_x0000_s304131" name="Equation" r:id="rId6" imgW="7315200" imgH="1866900" progId="Equation.DSMT4">
               <p:embed/>
             </p:oleObj>
           </a:graphicData>
@@ -35932,12 +35932,12 @@
           <p:nvPr/>
         </p:nvGraphicFramePr>
         <p:xfrm>
-          <a:off x="530225" y="2514600"/>
-          <a:ext cx="8007350" cy="1709738"/>
+          <a:off x="1524000" y="2971800"/>
+          <a:ext cx="6477000" cy="1619250"/>
         </p:xfrm>
         <a:graphic>
           <a:graphicData uri="http://schemas.openxmlformats.org/presentationml/2006/ole">
-            <p:oleObj spid="_x0000_s33793" name="Equation" r:id="rId4" imgW="2971800" imgH="634680" progId="Equation.DSMT4">
+            <p:oleObj spid="_x0000_s33793" name="Equation" r:id="rId4" imgW="2997200" imgH="622300" progId="Equation.DSMT4">
               <p:embed/>
             </p:oleObj>
           </a:graphicData>
@@ -35974,6 +35974,26 @@
           </a:p>
         </p:txBody>
       </p:sp>
+      <p:graphicFrame>
+        <p:nvGraphicFramePr>
+          <p:cNvPr id="6" name="Object 5"/>
+          <p:cNvGraphicFramePr>
+            <a:graphicFrameLocks noChangeAspect="1"/>
+          </p:cNvGraphicFramePr>
+          <p:nvPr/>
+        </p:nvGraphicFramePr>
+        <p:xfrm>
+          <a:off x="4514850" y="3346450"/>
+          <a:ext cx="114300" cy="165100"/>
+        </p:xfrm>
+        <a:graphic>
+          <a:graphicData uri="http://schemas.openxmlformats.org/presentationml/2006/ole">
+            <p:oleObj spid="_x0000_s33796" name="Equation" r:id="rId5" imgW="114300" imgH="165100" progId="Equation.DSMT4">
+              <p:embed/>
+            </p:oleObj>
+          </a:graphicData>
+        </a:graphic>
+      </p:graphicFrame>
     </p:spTree>
   </p:cSld>
   <p:clrMapOvr>
@@ -36399,7 +36419,7 @@
         </p:xfrm>
         <a:graphic>
           <a:graphicData uri="http://schemas.openxmlformats.org/presentationml/2006/ole">
-            <p:oleObj spid="_x0000_s1026" name="Equation" r:id="rId4" imgW="914400" imgH="198720" progId="Equation.DSMT4">
+            <p:oleObj spid="_x0000_s1026" name="Equation" r:id="rId4" imgW="3657600" imgH="5689600" progId="Equation.DSMT4">
               <p:embed/>
             </p:oleObj>
           </a:graphicData>
@@ -36449,7 +36469,7 @@
         </p:xfrm>
         <a:graphic>
           <a:graphicData uri="http://schemas.openxmlformats.org/presentationml/2006/ole">
-            <p:oleObj spid="_x0000_s1027" name="Equation" r:id="rId5" imgW="2971800" imgH="634680" progId="Equation.DSMT4">
+            <p:oleObj spid="_x0000_s1027" name="Equation" r:id="rId5" imgW="7315200" imgH="1562100" progId="Equation.DSMT4">
               <p:embed/>
             </p:oleObj>
           </a:graphicData>
@@ -36851,7 +36871,7 @@
         </p:xfrm>
         <a:graphic>
           <a:graphicData uri="http://schemas.openxmlformats.org/presentationml/2006/ole">
-            <p:oleObj spid="_x0000_s2050" name="Equation" r:id="rId4" imgW="609480" imgH="393480" progId="Equation.DSMT4">
+            <p:oleObj spid="_x0000_s2050" name="Equation" r:id="rId4" imgW="7315200" imgH="4724400" progId="Equation.DSMT4">
               <p:embed/>
             </p:oleObj>
           </a:graphicData>
@@ -36871,7 +36891,7 @@
         </p:xfrm>
         <a:graphic>
           <a:graphicData uri="http://schemas.openxmlformats.org/presentationml/2006/ole">
-            <p:oleObj spid="_x0000_s2051" name="Equation" r:id="rId5" imgW="1688760" imgH="457200" progId="Equation.DSMT4">
+            <p:oleObj spid="_x0000_s2051" name="Equation" r:id="rId5" imgW="7315200" imgH="1981200" progId="Equation.DSMT4">
               <p:embed/>
             </p:oleObj>
           </a:graphicData>
@@ -37449,7 +37469,7 @@
         </p:xfrm>
         <a:graphic>
           <a:graphicData uri="http://schemas.openxmlformats.org/presentationml/2006/ole">
-            <p:oleObj spid="_x0000_s3074" name="Equation" r:id="rId4" imgW="2552400" imgH="419040" progId="Equation.DSMT4">
+            <p:oleObj spid="_x0000_s3074" name="Equation" r:id="rId4" imgW="7315200" imgH="1206500" progId="Equation.DSMT4">
               <p:embed/>
             </p:oleObj>
           </a:graphicData>
@@ -37547,7 +37567,7 @@
         </p:xfrm>
         <a:graphic>
           <a:graphicData uri="http://schemas.openxmlformats.org/presentationml/2006/ole">
-            <p:oleObj spid="_x0000_s3078" name="Equation" r:id="rId5" imgW="2070000" imgH="419040" progId="Equation.DSMT4">
+            <p:oleObj spid="_x0000_s3078" name="Equation" r:id="rId5" imgW="7315200" imgH="1485900" progId="Equation.DSMT4">
               <p:embed/>
             </p:oleObj>
           </a:graphicData>

</xml_diff>